<commit_message>
new apt and mov files
</commit_message>
<xml_diff>
--- a/Documents/presentation.pptx
+++ b/Documents/presentation.pptx
@@ -5932,7 +5932,15 @@
             <a:pPr algn="just"/>
             <a:r>
               <a:rPr lang="en-US" dirty="0" smtClean="0"/>
-              <a:t>Allows users to visualize and share data (sensors values, media, web links etc.)</a:t>
+              <a:t>Allows users to visualize and </a:t>
+            </a:r>
+            <a:r>
+              <a:rPr lang="en-US" dirty="0" smtClean="0"/>
+              <a:t>anonymously share data and digital content </a:t>
+            </a:r>
+            <a:r>
+              <a:rPr lang="en-US" dirty="0" smtClean="0"/>
+              <a:t>(sensors values, media, web links etc.)</a:t>
             </a:r>
           </a:p>
           <a:p>

</xml_diff>

<commit_message>
New version and changes
</commit_message>
<xml_diff>
--- a/Documents/presentation.pptx
+++ b/Documents/presentation.pptx
@@ -17,6 +17,7 @@
     <p:sldId id="262" r:id="rId11"/>
     <p:sldId id="267" r:id="rId12"/>
     <p:sldId id="269" r:id="rId13"/>
+    <p:sldId id="270" r:id="rId14"/>
   </p:sldIdLst>
   <p:sldSz cx="9144000" cy="5143500" type="screen16x9"/>
   <p:notesSz cx="6858000" cy="9144000"/>
@@ -337,7 +338,7 @@
           <a:p>
             <a:fld id="{70FAA508-F0CD-46EA-95FB-26B559A0B5D9}" type="datetimeFigureOut">
               <a:rPr lang="en-US" smtClean="0"/>
-              <a:t>07/10/15</a:t>
+              <a:t>19/10/15</a:t>
             </a:fld>
             <a:endParaRPr lang="en-US"/>
           </a:p>
@@ -658,7 +659,7 @@
           <a:p>
             <a:fld id="{70FAA508-F0CD-46EA-95FB-26B559A0B5D9}" type="datetimeFigureOut">
               <a:rPr lang="en-US" smtClean="0"/>
-              <a:t>07/10/15</a:t>
+              <a:t>19/10/15</a:t>
             </a:fld>
             <a:endParaRPr lang="en-US"/>
           </a:p>
@@ -935,7 +936,7 @@
           <a:p>
             <a:fld id="{70FAA508-F0CD-46EA-95FB-26B559A0B5D9}" type="datetimeFigureOut">
               <a:rPr lang="en-US" smtClean="0"/>
-              <a:t>07/10/15</a:t>
+              <a:t>19/10/15</a:t>
             </a:fld>
             <a:endParaRPr lang="en-US"/>
           </a:p>
@@ -1229,7 +1230,7 @@
           <a:p>
             <a:fld id="{70FAA508-F0CD-46EA-95FB-26B559A0B5D9}" type="datetimeFigureOut">
               <a:rPr lang="en-US" smtClean="0"/>
-              <a:t>07/10/15</a:t>
+              <a:t>19/10/15</a:t>
             </a:fld>
             <a:endParaRPr lang="en-US"/>
           </a:p>
@@ -1558,7 +1559,7 @@
           <a:p>
             <a:fld id="{70FAA508-F0CD-46EA-95FB-26B559A0B5D9}" type="datetimeFigureOut">
               <a:rPr lang="en-US" smtClean="0"/>
-              <a:t>07/10/15</a:t>
+              <a:t>19/10/15</a:t>
             </a:fld>
             <a:endParaRPr lang="en-US"/>
           </a:p>
@@ -1809,7 +1810,7 @@
           <a:p>
             <a:fld id="{70FAA508-F0CD-46EA-95FB-26B559A0B5D9}" type="datetimeFigureOut">
               <a:rPr lang="en-US" smtClean="0"/>
-              <a:t>07/10/15</a:t>
+              <a:t>19/10/15</a:t>
             </a:fld>
             <a:endParaRPr lang="en-US"/>
           </a:p>
@@ -1988,7 +1989,7 @@
           <a:p>
             <a:fld id="{70FAA508-F0CD-46EA-95FB-26B559A0B5D9}" type="datetimeFigureOut">
               <a:rPr lang="en-US" smtClean="0"/>
-              <a:t>07/10/15</a:t>
+              <a:t>19/10/15</a:t>
             </a:fld>
             <a:endParaRPr lang="en-US"/>
           </a:p>
@@ -2157,7 +2158,7 @@
           <a:p>
             <a:fld id="{70FAA508-F0CD-46EA-95FB-26B559A0B5D9}" type="datetimeFigureOut">
               <a:rPr lang="en-US" smtClean="0"/>
-              <a:t>07/10/15</a:t>
+              <a:t>19/10/15</a:t>
             </a:fld>
             <a:endParaRPr lang="en-US"/>
           </a:p>
@@ -2426,7 +2427,7 @@
           <a:p>
             <a:fld id="{70FAA508-F0CD-46EA-95FB-26B559A0B5D9}" type="datetimeFigureOut">
               <a:rPr lang="en-US" smtClean="0"/>
-              <a:t>07/10/15</a:t>
+              <a:t>19/10/15</a:t>
             </a:fld>
             <a:endParaRPr lang="en-US"/>
           </a:p>
@@ -2733,7 +2734,7 @@
           <a:p>
             <a:fld id="{70FAA508-F0CD-46EA-95FB-26B559A0B5D9}" type="datetimeFigureOut">
               <a:rPr lang="en-US" smtClean="0"/>
-              <a:t>07/10/15</a:t>
+              <a:t>19/10/15</a:t>
             </a:fld>
             <a:endParaRPr lang="en-US"/>
           </a:p>
@@ -3025,7 +3026,7 @@
           <a:p>
             <a:fld id="{70FAA508-F0CD-46EA-95FB-26B559A0B5D9}" type="datetimeFigureOut">
               <a:rPr lang="en-US" smtClean="0"/>
-              <a:t>07/10/15</a:t>
+              <a:t>19/10/15</a:t>
             </a:fld>
             <a:endParaRPr lang="en-US"/>
           </a:p>
@@ -3455,7 +3456,7 @@
           <a:p>
             <a:fld id="{70FAA508-F0CD-46EA-95FB-26B559A0B5D9}" type="datetimeFigureOut">
               <a:rPr lang="en-US" smtClean="0"/>
-              <a:t>07/10/15</a:t>
+              <a:t>19/10/15</a:t>
             </a:fld>
             <a:endParaRPr lang="en-US"/>
           </a:p>
@@ -3801,7 +3802,7 @@
           <a:p>
             <a:fld id="{70FAA508-F0CD-46EA-95FB-26B559A0B5D9}" type="datetimeFigureOut">
               <a:rPr lang="en-US" smtClean="0"/>
-              <a:t>07/10/15</a:t>
+              <a:t>19/10/15</a:t>
             </a:fld>
             <a:endParaRPr lang="en-US"/>
           </a:p>
@@ -3891,7 +3892,7 @@
           <a:p>
             <a:fld id="{70FAA508-F0CD-46EA-95FB-26B559A0B5D9}" type="datetimeFigureOut">
               <a:rPr lang="en-US" smtClean="0"/>
-              <a:t>07/10/15</a:t>
+              <a:t>19/10/15</a:t>
             </a:fld>
             <a:endParaRPr lang="en-US"/>
           </a:p>
@@ -4228,7 +4229,7 @@
           <a:p>
             <a:fld id="{70FAA508-F0CD-46EA-95FB-26B559A0B5D9}" type="datetimeFigureOut">
               <a:rPr lang="en-US" smtClean="0"/>
-              <a:t>07/10/15</a:t>
+              <a:t>19/10/15</a:t>
             </a:fld>
             <a:endParaRPr lang="en-US"/>
           </a:p>
@@ -4440,7 +4441,7 @@
           <a:p>
             <a:fld id="{70FAA508-F0CD-46EA-95FB-26B559A0B5D9}" type="datetimeFigureOut">
               <a:rPr lang="en-US" smtClean="0"/>
-              <a:t>07/10/15</a:t>
+              <a:t>19/10/15</a:t>
             </a:fld>
             <a:endParaRPr lang="en-US"/>
           </a:p>
@@ -5830,6 +5831,129 @@
 </p:sld>
 </file>
 
+<file path=ppt/slides/slide13.xml><?xml version="1.0" encoding="utf-8"?>
+<p:sld xmlns:a="http://schemas.openxmlformats.org/drawingml/2006/main" xmlns:r="http://schemas.openxmlformats.org/officeDocument/2006/relationships" xmlns:p="http://schemas.openxmlformats.org/presentationml/2006/main">
+  <p:cSld>
+    <p:spTree>
+      <p:nvGrpSpPr>
+        <p:cNvPr id="1" name=""/>
+        <p:cNvGrpSpPr/>
+        <p:nvPr/>
+      </p:nvGrpSpPr>
+      <p:grpSpPr>
+        <a:xfrm>
+          <a:off x="0" y="0"/>
+          <a:ext cx="0" cy="0"/>
+          <a:chOff x="0" y="0"/>
+          <a:chExt cx="0" cy="0"/>
+        </a:xfrm>
+      </p:grpSpPr>
+      <p:sp>
+        <p:nvSpPr>
+          <p:cNvPr id="5" name="Title 1"/>
+          <p:cNvSpPr>
+            <a:spLocks noGrp="1"/>
+          </p:cNvSpPr>
+          <p:nvPr>
+            <p:ph type="title"/>
+          </p:nvPr>
+        </p:nvSpPr>
+        <p:spPr>
+          <a:xfrm>
+            <a:off x="1" y="2470374"/>
+            <a:ext cx="8913813" cy="685800"/>
+          </a:xfrm>
+        </p:spPr>
+        <p:txBody>
+          <a:bodyPr>
+            <a:normAutofit/>
+          </a:bodyPr>
+          <a:lstStyle/>
+          <a:p>
+            <a:r>
+              <a:rPr lang="en-US" dirty="0" smtClean="0"/>
+              <a:t>Sample Video</a:t>
+            </a:r>
+            <a:endParaRPr lang="en-US" dirty="0"/>
+          </a:p>
+        </p:txBody>
+      </p:sp>
+      <p:sp>
+        <p:nvSpPr>
+          <p:cNvPr id="6" name="TextBox 5"/>
+          <p:cNvSpPr txBox="1"/>
+          <p:nvPr/>
+        </p:nvSpPr>
+        <p:spPr>
+          <a:xfrm>
+            <a:off x="1505186" y="3461926"/>
+            <a:ext cx="5856065" cy="369332"/>
+          </a:xfrm>
+          <a:prstGeom prst="rect">
+            <a:avLst/>
+          </a:prstGeom>
+          <a:noFill/>
+        </p:spPr>
+        <p:txBody>
+          <a:bodyPr wrap="none" rtlCol="0">
+            <a:spAutoFit/>
+          </a:bodyPr>
+          <a:lstStyle/>
+          <a:p>
+            <a:r>
+              <a:rPr lang="en-US" dirty="0">
+                <a:hlinkClick r:id="rId2"/>
+              </a:rPr>
+              <a:t>https://</a:t>
+            </a:r>
+            <a:r>
+              <a:rPr lang="en-US" dirty="0" err="1">
+                <a:hlinkClick r:id="rId2"/>
+              </a:rPr>
+              <a:t>www.youtube.com</a:t>
+            </a:r>
+            <a:r>
+              <a:rPr lang="en-US" dirty="0">
+                <a:hlinkClick r:id="rId2"/>
+              </a:rPr>
+              <a:t>/</a:t>
+            </a:r>
+            <a:r>
+              <a:rPr lang="en-US" dirty="0" err="1">
+                <a:hlinkClick r:id="rId2"/>
+              </a:rPr>
+              <a:t>watch?v</a:t>
+            </a:r>
+            <a:r>
+              <a:rPr lang="en-US" dirty="0">
+                <a:hlinkClick r:id="rId2"/>
+              </a:rPr>
+              <a:t>=i7NHOCpvFIY</a:t>
+            </a:r>
+            <a:endParaRPr lang="en-US" dirty="0"/>
+          </a:p>
+        </p:txBody>
+      </p:sp>
+    </p:spTree>
+    <p:extLst>
+      <p:ext uri="{BB962C8B-B14F-4D97-AF65-F5344CB8AC3E}">
+        <p14:creationId xmlns:p14="http://schemas.microsoft.com/office/powerpoint/2010/main" val="1125217210"/>
+      </p:ext>
+    </p:extLst>
+  </p:cSld>
+  <p:clrMapOvr>
+    <a:masterClrMapping/>
+  </p:clrMapOvr>
+  <p:timing>
+    <p:tnLst>
+      <p:par>
+        <p:cTn xmlns:p14="http://schemas.microsoft.com/office/powerpoint/2010/main" id="1" dur="indefinite" restart="never" nodeType="tmRoot"/>
+      </p:par>
+    </p:tnLst>
+  </p:timing>
+</p:sld>
+</file>
+
 <file path=ppt/slides/slide2.xml><?xml version="1.0" encoding="utf-8"?>
 <p:sld xmlns:a="http://schemas.openxmlformats.org/drawingml/2006/main" xmlns:r="http://schemas.openxmlformats.org/officeDocument/2006/relationships" xmlns:p="http://schemas.openxmlformats.org/presentationml/2006/main">
   <p:cSld>
@@ -5932,15 +6056,7 @@
             <a:pPr algn="just"/>
             <a:r>
               <a:rPr lang="en-US" dirty="0" smtClean="0"/>
-              <a:t>Allows users to visualize and </a:t>
-            </a:r>
-            <a:r>
-              <a:rPr lang="en-US" dirty="0" smtClean="0"/>
-              <a:t>anonymously share data and digital content </a:t>
-            </a:r>
-            <a:r>
-              <a:rPr lang="en-US" dirty="0" smtClean="0"/>
-              <a:t>(sensors values, media, web links etc.)</a:t>
+              <a:t>Allows users to visualize and anonymously share data and digital content (sensors values, media, web links etc.)</a:t>
             </a:r>
           </a:p>
           <a:p>
@@ -6770,7 +6886,7 @@
         </p:spPr>
         <p:txBody>
           <a:bodyPr>
-            <a:normAutofit fontScale="92500" lnSpcReduction="20000"/>
+            <a:normAutofit fontScale="92500" lnSpcReduction="10000"/>
           </a:bodyPr>
           <a:lstStyle/>
           <a:p>
@@ -6813,46 +6929,47 @@
               <a:buNone/>
             </a:pPr>
             <a:r>
-              <a:rPr lang="en-US" i="1" dirty="0" smtClean="0">
+              <a:rPr lang="en-US" dirty="0">
                 <a:hlinkClick r:id="rId3"/>
               </a:rPr>
-              <a:t>https</a:t>
-            </a:r>
-            <a:r>
-              <a:rPr lang="en-US" i="1" dirty="0">
+              <a:t>https://play.google.com/store/apps/details?id=</a:t>
+            </a:r>
+            <a:r>
+              <a:rPr lang="en-US" dirty="0" smtClean="0">
                 <a:hlinkClick r:id="rId3"/>
               </a:rPr>
-              <a:t>://play.google.com/apps/</a:t>
-            </a:r>
-            <a:r>
-              <a:rPr lang="en-US" i="1" dirty="0" smtClean="0">
-                <a:hlinkClick r:id="rId3"/>
-              </a:rPr>
-              <a:t>testing/ch.ethz.coss.nervous.pulse</a:t>
-            </a:r>
-            <a:endParaRPr lang="en-US" i="1" dirty="0" smtClean="0"/>
+              <a:t>ch.ethz.coss.nervous.pulse</a:t>
+            </a:r>
+            <a:endParaRPr lang="en-US" dirty="0" smtClean="0"/>
           </a:p>
           <a:p>
             <a:pPr marL="698500" lvl="2" indent="0">
               <a:buNone/>
             </a:pPr>
-            <a:r>
-              <a:rPr lang="en-US" sz="1400" dirty="0" smtClean="0"/>
-              <a:t>(Open only for testing. You have to opt in for Alpha Testing after visiting the above URL on the Android phone)</a:t>
-            </a:r>
-          </a:p>
-          <a:p>
+            <a:endParaRPr lang="en-US" dirty="0"/>
+          </a:p>
+          <a:p>
+            <a:pPr marL="635000" lvl="1" indent="-285750"/>
             <a:r>
               <a:rPr lang="en-US" dirty="0" smtClean="0"/>
-              <a:t>Website for visualization:</a:t>
-            </a:r>
-            <a:endParaRPr lang="en-US" dirty="0" smtClean="0"/>
-          </a:p>
-          <a:p>
-            <a:pPr lvl="1"/>
+              <a:t>Website </a:t>
+            </a:r>
             <a:r>
               <a:rPr lang="en-US" dirty="0" smtClean="0"/>
-              <a:t>View website at: </a:t>
+              <a:t>for visualization:</a:t>
+            </a:r>
+          </a:p>
+          <a:p>
+            <a:pPr marL="349250" lvl="1" indent="0">
+              <a:buNone/>
+            </a:pPr>
+            <a:r>
+              <a:rPr lang="en-US" dirty="0" smtClean="0"/>
+              <a:t>	View </a:t>
+            </a:r>
+            <a:r>
+              <a:rPr lang="en-US" dirty="0" smtClean="0"/>
+              <a:t>website at: </a:t>
             </a:r>
             <a:r>
               <a:rPr lang="en-US" i="1" dirty="0">
@@ -7196,7 +7313,31 @@
             <a:pPr lvl="1" algn="just"/>
             <a:r>
               <a:rPr lang="en-US" dirty="0" smtClean="0"/>
-              <a:t>Secondly the pulse of the system is set to 60 seconds, i.e. data is removed after 60 seconds in Real-Time view and in the Time-Machine view the results are limited to only 60 seconds from the start time chosen by the user.</a:t>
+              <a:t>Secondly the pulse of the system is set to </a:t>
+            </a:r>
+            <a:r>
+              <a:rPr lang="en-US" dirty="0" smtClean="0"/>
+              <a:t>5 minutes, </a:t>
+            </a:r>
+            <a:r>
+              <a:rPr lang="en-US" dirty="0" smtClean="0"/>
+              <a:t>i.e. data is removed after </a:t>
+            </a:r>
+            <a:r>
+              <a:rPr lang="en-US" dirty="0" smtClean="0"/>
+              <a:t>5 minutes in </a:t>
+            </a:r>
+            <a:r>
+              <a:rPr lang="en-US" dirty="0" smtClean="0"/>
+              <a:t>Real-Time view and in the Time-Machine view the results are limited to only </a:t>
+            </a:r>
+            <a:r>
+              <a:rPr lang="en-US" dirty="0" smtClean="0"/>
+              <a:t>30 minutes </a:t>
+            </a:r>
+            <a:r>
+              <a:rPr lang="en-US" dirty="0" smtClean="0"/>
+              <a:t>from the start time chosen by the user.</a:t>
             </a:r>
             <a:endParaRPr lang="en-US" dirty="0"/>
           </a:p>

</xml_diff>

<commit_message>
new icon color and presentation and display poster
</commit_message>
<xml_diff>
--- a/Documents/presentation.pptx
+++ b/Documents/presentation.pptx
@@ -13,11 +13,12 @@
     <p:sldId id="260" r:id="rId7"/>
     <p:sldId id="266" r:id="rId8"/>
     <p:sldId id="263" r:id="rId9"/>
-    <p:sldId id="261" r:id="rId10"/>
-    <p:sldId id="262" r:id="rId11"/>
-    <p:sldId id="267" r:id="rId12"/>
-    <p:sldId id="269" r:id="rId13"/>
-    <p:sldId id="270" r:id="rId14"/>
+    <p:sldId id="271" r:id="rId10"/>
+    <p:sldId id="261" r:id="rId11"/>
+    <p:sldId id="262" r:id="rId12"/>
+    <p:sldId id="267" r:id="rId13"/>
+    <p:sldId id="269" r:id="rId14"/>
+    <p:sldId id="270" r:id="rId15"/>
   </p:sldIdLst>
   <p:sldSz cx="9144000" cy="5143500" type="screen16x9"/>
   <p:notesSz cx="6858000" cy="9144000"/>
@@ -338,7 +339,7 @@
           <a:p>
             <a:fld id="{70FAA508-F0CD-46EA-95FB-26B559A0B5D9}" type="datetimeFigureOut">
               <a:rPr lang="en-US" smtClean="0"/>
-              <a:t>20/10/15</a:t>
+              <a:t>28/10/15</a:t>
             </a:fld>
             <a:endParaRPr lang="en-US"/>
           </a:p>
@@ -659,7 +660,7 @@
           <a:p>
             <a:fld id="{70FAA508-F0CD-46EA-95FB-26B559A0B5D9}" type="datetimeFigureOut">
               <a:rPr lang="en-US" smtClean="0"/>
-              <a:t>20/10/15</a:t>
+              <a:t>28/10/15</a:t>
             </a:fld>
             <a:endParaRPr lang="en-US"/>
           </a:p>
@@ -936,7 +937,7 @@
           <a:p>
             <a:fld id="{70FAA508-F0CD-46EA-95FB-26B559A0B5D9}" type="datetimeFigureOut">
               <a:rPr lang="en-US" smtClean="0"/>
-              <a:t>20/10/15</a:t>
+              <a:t>28/10/15</a:t>
             </a:fld>
             <a:endParaRPr lang="en-US"/>
           </a:p>
@@ -1230,7 +1231,7 @@
           <a:p>
             <a:fld id="{70FAA508-F0CD-46EA-95FB-26B559A0B5D9}" type="datetimeFigureOut">
               <a:rPr lang="en-US" smtClean="0"/>
-              <a:t>20/10/15</a:t>
+              <a:t>28/10/15</a:t>
             </a:fld>
             <a:endParaRPr lang="en-US"/>
           </a:p>
@@ -1559,7 +1560,7 @@
           <a:p>
             <a:fld id="{70FAA508-F0CD-46EA-95FB-26B559A0B5D9}" type="datetimeFigureOut">
               <a:rPr lang="en-US" smtClean="0"/>
-              <a:t>20/10/15</a:t>
+              <a:t>28/10/15</a:t>
             </a:fld>
             <a:endParaRPr lang="en-US"/>
           </a:p>
@@ -1810,7 +1811,7 @@
           <a:p>
             <a:fld id="{70FAA508-F0CD-46EA-95FB-26B559A0B5D9}" type="datetimeFigureOut">
               <a:rPr lang="en-US" smtClean="0"/>
-              <a:t>20/10/15</a:t>
+              <a:t>28/10/15</a:t>
             </a:fld>
             <a:endParaRPr lang="en-US"/>
           </a:p>
@@ -1989,7 +1990,7 @@
           <a:p>
             <a:fld id="{70FAA508-F0CD-46EA-95FB-26B559A0B5D9}" type="datetimeFigureOut">
               <a:rPr lang="en-US" smtClean="0"/>
-              <a:t>20/10/15</a:t>
+              <a:t>28/10/15</a:t>
             </a:fld>
             <a:endParaRPr lang="en-US"/>
           </a:p>
@@ -2158,7 +2159,7 @@
           <a:p>
             <a:fld id="{70FAA508-F0CD-46EA-95FB-26B559A0B5D9}" type="datetimeFigureOut">
               <a:rPr lang="en-US" smtClean="0"/>
-              <a:t>20/10/15</a:t>
+              <a:t>28/10/15</a:t>
             </a:fld>
             <a:endParaRPr lang="en-US"/>
           </a:p>
@@ -2427,7 +2428,7 @@
           <a:p>
             <a:fld id="{70FAA508-F0CD-46EA-95FB-26B559A0B5D9}" type="datetimeFigureOut">
               <a:rPr lang="en-US" smtClean="0"/>
-              <a:t>20/10/15</a:t>
+              <a:t>28/10/15</a:t>
             </a:fld>
             <a:endParaRPr lang="en-US"/>
           </a:p>
@@ -2734,7 +2735,7 @@
           <a:p>
             <a:fld id="{70FAA508-F0CD-46EA-95FB-26B559A0B5D9}" type="datetimeFigureOut">
               <a:rPr lang="en-US" smtClean="0"/>
-              <a:t>20/10/15</a:t>
+              <a:t>28/10/15</a:t>
             </a:fld>
             <a:endParaRPr lang="en-US"/>
           </a:p>
@@ -3026,7 +3027,7 @@
           <a:p>
             <a:fld id="{70FAA508-F0CD-46EA-95FB-26B559A0B5D9}" type="datetimeFigureOut">
               <a:rPr lang="en-US" smtClean="0"/>
-              <a:t>20/10/15</a:t>
+              <a:t>28/10/15</a:t>
             </a:fld>
             <a:endParaRPr lang="en-US"/>
           </a:p>
@@ -3456,7 +3457,7 @@
           <a:p>
             <a:fld id="{70FAA508-F0CD-46EA-95FB-26B559A0B5D9}" type="datetimeFigureOut">
               <a:rPr lang="en-US" smtClean="0"/>
-              <a:t>20/10/15</a:t>
+              <a:t>28/10/15</a:t>
             </a:fld>
             <a:endParaRPr lang="en-US"/>
           </a:p>
@@ -3802,7 +3803,7 @@
           <a:p>
             <a:fld id="{70FAA508-F0CD-46EA-95FB-26B559A0B5D9}" type="datetimeFigureOut">
               <a:rPr lang="en-US" smtClean="0"/>
-              <a:t>20/10/15</a:t>
+              <a:t>28/10/15</a:t>
             </a:fld>
             <a:endParaRPr lang="en-US"/>
           </a:p>
@@ -3892,7 +3893,7 @@
           <a:p>
             <a:fld id="{70FAA508-F0CD-46EA-95FB-26B559A0B5D9}" type="datetimeFigureOut">
               <a:rPr lang="en-US" smtClean="0"/>
-              <a:t>20/10/15</a:t>
+              <a:t>28/10/15</a:t>
             </a:fld>
             <a:endParaRPr lang="en-US"/>
           </a:p>
@@ -4229,7 +4230,7 @@
           <a:p>
             <a:fld id="{70FAA508-F0CD-46EA-95FB-26B559A0B5D9}" type="datetimeFigureOut">
               <a:rPr lang="en-US" smtClean="0"/>
-              <a:t>20/10/15</a:t>
+              <a:t>28/10/15</a:t>
             </a:fld>
             <a:endParaRPr lang="en-US"/>
           </a:p>
@@ -4441,7 +4442,7 @@
           <a:p>
             <a:fld id="{70FAA508-F0CD-46EA-95FB-26B559A0B5D9}" type="datetimeFigureOut">
               <a:rPr lang="en-US" smtClean="0"/>
-              <a:t>20/10/15</a:t>
+              <a:t>28/10/15</a:t>
             </a:fld>
             <a:endParaRPr lang="en-US"/>
           </a:p>
@@ -4987,16 +4988,21 @@
             <p:ph type="ctrTitle"/>
           </p:nvPr>
         </p:nvSpPr>
-        <p:spPr/>
+        <p:spPr>
+          <a:xfrm>
+            <a:off x="0" y="1693333"/>
+            <a:ext cx="8915400" cy="583024"/>
+          </a:xfrm>
+        </p:spPr>
         <p:txBody>
           <a:bodyPr>
-            <a:normAutofit/>
+            <a:normAutofit fontScale="90000"/>
           </a:bodyPr>
           <a:lstStyle/>
           <a:p>
             <a:r>
-              <a:rPr lang="en-US" b="1" dirty="0" smtClean="0"/>
-              <a:t>Pulse</a:t>
+              <a:rPr lang="en-US" b="1" dirty="0" err="1" smtClean="0"/>
+              <a:t>SwarmPulse</a:t>
             </a:r>
             <a:r>
               <a:rPr lang="en-US" dirty="0" smtClean="0"/>
@@ -5048,18 +5054,11 @@
           <a:lstStyle/>
           <a:p>
             <a:r>
-              <a:rPr lang="en-US" dirty="0" smtClean="0">
-                <a:latin typeface="Bradley Hand Bold"/>
-                <a:cs typeface="Bradley Hand Bold"/>
-              </a:rPr>
-              <a:t>http://</a:t>
-            </a:r>
-            <a:r>
               <a:rPr lang="en-US" dirty="0" err="1" smtClean="0">
                 <a:latin typeface="Bradley Hand Bold"/>
                 <a:cs typeface="Bradley Hand Bold"/>
               </a:rPr>
-              <a:t>pulse.inn.ac</a:t>
+              <a:t>www.Swarmpulse.net</a:t>
             </a:r>
             <a:endParaRPr lang="en-US" dirty="0">
               <a:latin typeface="Bradley Hand Bold"/>
@@ -5070,7 +5069,7 @@
       </p:sp>
       <p:pic>
         <p:nvPicPr>
-          <p:cNvPr id="5" name="Picture 4"/>
+          <p:cNvPr id="6" name="Picture 5"/>
           <p:cNvPicPr>
             <a:picLocks noChangeAspect="1"/>
           </p:cNvPicPr>
@@ -5084,8 +5083,8 @@
         </p:blipFill>
         <p:spPr>
           <a:xfrm>
-            <a:off x="7315200" y="846665"/>
-            <a:ext cx="1828800" cy="1828800"/>
+            <a:off x="7627523" y="1599087"/>
+            <a:ext cx="1344319" cy="1344319"/>
           </a:xfrm>
           <a:prstGeom prst="rect">
             <a:avLst/>
@@ -5153,323 +5152,10 @@
           </a:prstGeom>
         </p:spPr>
       </p:pic>
-      <p:sp>
-        <p:nvSpPr>
-          <p:cNvPr id="10" name="Line Callout 2 9"/>
-          <p:cNvSpPr/>
-          <p:nvPr/>
-        </p:nvSpPr>
-        <p:spPr>
-          <a:xfrm>
-            <a:off x="1514593" y="620890"/>
-            <a:ext cx="809037" cy="225778"/>
-          </a:xfrm>
-          <a:prstGeom prst="borderCallout2">
-            <a:avLst>
-              <a:gd name="adj1" fmla="val 18750"/>
-              <a:gd name="adj2" fmla="val -8333"/>
-              <a:gd name="adj3" fmla="val 18750"/>
-              <a:gd name="adj4" fmla="val -16667"/>
-              <a:gd name="adj5" fmla="val 53316"/>
-              <a:gd name="adj6" fmla="val -83402"/>
-            </a:avLst>
-          </a:prstGeom>
-        </p:spPr>
-        <p:style>
-          <a:lnRef idx="2">
-            <a:schemeClr val="accent6">
-              <a:shade val="50000"/>
-            </a:schemeClr>
-          </a:lnRef>
-          <a:fillRef idx="1">
-            <a:schemeClr val="accent6"/>
-          </a:fillRef>
-          <a:effectRef idx="0">
-            <a:schemeClr val="accent6"/>
-          </a:effectRef>
-          <a:fontRef idx="minor">
-            <a:schemeClr val="lt1"/>
-          </a:fontRef>
-        </p:style>
-        <p:txBody>
-          <a:bodyPr rtlCol="0" anchor="ctr"/>
-          <a:lstStyle/>
-          <a:p>
-            <a:pPr algn="ctr"/>
-            <a:r>
-              <a:rPr lang="en-US" sz="1200" dirty="0" smtClean="0"/>
-              <a:t>Layers</a:t>
-            </a:r>
-            <a:endParaRPr lang="en-US" sz="1200" dirty="0"/>
-          </a:p>
-        </p:txBody>
-      </p:sp>
-      <p:sp>
-        <p:nvSpPr>
-          <p:cNvPr id="11" name="Line Callout 2 10"/>
-          <p:cNvSpPr/>
-          <p:nvPr/>
-        </p:nvSpPr>
-        <p:spPr>
-          <a:xfrm>
-            <a:off x="2824104" y="4684419"/>
-            <a:ext cx="4278489" cy="460963"/>
-          </a:xfrm>
-          <a:prstGeom prst="borderCallout2">
-            <a:avLst>
-              <a:gd name="adj1" fmla="val 18750"/>
-              <a:gd name="adj2" fmla="val -8333"/>
-              <a:gd name="adj3" fmla="val 18750"/>
-              <a:gd name="adj4" fmla="val -16667"/>
-              <a:gd name="adj5" fmla="val 36990"/>
-              <a:gd name="adj6" fmla="val -44888"/>
-            </a:avLst>
-          </a:prstGeom>
-        </p:spPr>
-        <p:style>
-          <a:lnRef idx="2">
-            <a:schemeClr val="accent6">
-              <a:shade val="50000"/>
-            </a:schemeClr>
-          </a:lnRef>
-          <a:fillRef idx="1">
-            <a:schemeClr val="accent6"/>
-          </a:fillRef>
-          <a:effectRef idx="0">
-            <a:schemeClr val="accent6"/>
-          </a:effectRef>
-          <a:fontRef idx="minor">
-            <a:schemeClr val="lt1"/>
-          </a:fontRef>
-        </p:style>
-        <p:txBody>
-          <a:bodyPr rtlCol="0" anchor="ctr"/>
-          <a:lstStyle/>
-          <a:p>
-            <a:pPr algn="ctr"/>
-            <a:r>
-              <a:rPr lang="en-US" sz="1200" dirty="0" smtClean="0"/>
-              <a:t>Time-Machine.</a:t>
-            </a:r>
-          </a:p>
-          <a:p>
-            <a:pPr algn="ctr"/>
-            <a:r>
-              <a:rPr lang="en-US" sz="1200" dirty="0" smtClean="0"/>
-              <a:t>(Select Date &amp; Time to visualize data from the past)</a:t>
-            </a:r>
-            <a:endParaRPr lang="en-US" sz="1200" dirty="0"/>
-          </a:p>
-        </p:txBody>
-      </p:sp>
-      <p:sp>
-        <p:nvSpPr>
-          <p:cNvPr id="12" name="Line Callout 2 11"/>
-          <p:cNvSpPr/>
-          <p:nvPr/>
-        </p:nvSpPr>
-        <p:spPr>
-          <a:xfrm>
-            <a:off x="5597407" y="1403584"/>
-            <a:ext cx="2372549" cy="460963"/>
-          </a:xfrm>
-          <a:prstGeom prst="borderCallout2">
-            <a:avLst>
-              <a:gd name="adj1" fmla="val 33036"/>
-              <a:gd name="adj2" fmla="val 102132"/>
-              <a:gd name="adj3" fmla="val 20791"/>
-              <a:gd name="adj4" fmla="val 129845"/>
-              <a:gd name="adj5" fmla="val -75255"/>
-              <a:gd name="adj6" fmla="val 143692"/>
-            </a:avLst>
-          </a:prstGeom>
-        </p:spPr>
-        <p:style>
-          <a:lnRef idx="2">
-            <a:schemeClr val="accent6">
-              <a:shade val="50000"/>
-            </a:schemeClr>
-          </a:lnRef>
-          <a:fillRef idx="1">
-            <a:schemeClr val="accent6"/>
-          </a:fillRef>
-          <a:effectRef idx="0">
-            <a:schemeClr val="accent6"/>
-          </a:effectRef>
-          <a:fontRef idx="minor">
-            <a:schemeClr val="lt1"/>
-          </a:fontRef>
-        </p:style>
-        <p:txBody>
-          <a:bodyPr rtlCol="0" anchor="ctr"/>
-          <a:lstStyle/>
-          <a:p>
-            <a:pPr algn="ctr"/>
-            <a:r>
-              <a:rPr lang="en-US" sz="1200" dirty="0" smtClean="0"/>
-              <a:t>Real-time or Time-Machine Indicator</a:t>
-            </a:r>
-            <a:endParaRPr lang="en-US" sz="1200" dirty="0"/>
-          </a:p>
-        </p:txBody>
-      </p:sp>
-      <p:sp>
-        <p:nvSpPr>
-          <p:cNvPr id="13" name="Line Callout 2 12"/>
-          <p:cNvSpPr/>
-          <p:nvPr/>
-        </p:nvSpPr>
-        <p:spPr>
-          <a:xfrm>
-            <a:off x="4018845" y="846668"/>
-            <a:ext cx="2372549" cy="460963"/>
-          </a:xfrm>
-          <a:prstGeom prst="borderCallout2">
-            <a:avLst>
-              <a:gd name="adj1" fmla="val 33036"/>
-              <a:gd name="adj2" fmla="val 102132"/>
-              <a:gd name="adj3" fmla="val 20791"/>
-              <a:gd name="adj4" fmla="val 129845"/>
-              <a:gd name="adj5" fmla="val -24235"/>
-              <a:gd name="adj6" fmla="val 205944"/>
-            </a:avLst>
-          </a:prstGeom>
-        </p:spPr>
-        <p:style>
-          <a:lnRef idx="2">
-            <a:schemeClr val="accent6">
-              <a:shade val="50000"/>
-            </a:schemeClr>
-          </a:lnRef>
-          <a:fillRef idx="1">
-            <a:schemeClr val="accent6"/>
-          </a:fillRef>
-          <a:effectRef idx="0">
-            <a:schemeClr val="accent6"/>
-          </a:effectRef>
-          <a:fontRef idx="minor">
-            <a:schemeClr val="lt1"/>
-          </a:fontRef>
-        </p:style>
-        <p:txBody>
-          <a:bodyPr rtlCol="0" anchor="ctr"/>
-          <a:lstStyle/>
-          <a:p>
-            <a:pPr algn="ctr"/>
-            <a:r>
-              <a:rPr lang="en-US" sz="1200" dirty="0" smtClean="0"/>
-              <a:t>Server Connection Status Indicator</a:t>
-            </a:r>
-            <a:endParaRPr lang="en-US" sz="1200" dirty="0"/>
-          </a:p>
-        </p:txBody>
-      </p:sp>
-      <p:sp>
-        <p:nvSpPr>
-          <p:cNvPr id="14" name="Line Callout 2 13"/>
-          <p:cNvSpPr/>
-          <p:nvPr/>
-        </p:nvSpPr>
-        <p:spPr>
-          <a:xfrm>
-            <a:off x="5276614" y="276576"/>
-            <a:ext cx="2372549" cy="460963"/>
-          </a:xfrm>
-          <a:prstGeom prst="borderCallout2">
-            <a:avLst>
-              <a:gd name="adj1" fmla="val 33036"/>
-              <a:gd name="adj2" fmla="val 102132"/>
-              <a:gd name="adj3" fmla="val 20791"/>
-              <a:gd name="adj4" fmla="val 129845"/>
-              <a:gd name="adj5" fmla="val 49235"/>
-              <a:gd name="adj6" fmla="val 154794"/>
-            </a:avLst>
-          </a:prstGeom>
-        </p:spPr>
-        <p:style>
-          <a:lnRef idx="2">
-            <a:schemeClr val="accent6">
-              <a:shade val="50000"/>
-            </a:schemeClr>
-          </a:lnRef>
-          <a:fillRef idx="1">
-            <a:schemeClr val="accent6"/>
-          </a:fillRef>
-          <a:effectRef idx="0">
-            <a:schemeClr val="accent6"/>
-          </a:effectRef>
-          <a:fontRef idx="minor">
-            <a:schemeClr val="lt1"/>
-          </a:fontRef>
-        </p:style>
-        <p:txBody>
-          <a:bodyPr rtlCol="0" anchor="ctr"/>
-          <a:lstStyle/>
-          <a:p>
-            <a:pPr algn="ctr"/>
-            <a:r>
-              <a:rPr lang="en-US" sz="1200" dirty="0" smtClean="0"/>
-              <a:t>Download Mobile App button</a:t>
-            </a:r>
-            <a:endParaRPr lang="en-US" sz="1200" dirty="0"/>
-          </a:p>
-        </p:txBody>
-      </p:sp>
-      <p:sp>
-        <p:nvSpPr>
-          <p:cNvPr id="8" name="Line Callout 2 7"/>
-          <p:cNvSpPr/>
-          <p:nvPr/>
-        </p:nvSpPr>
-        <p:spPr>
-          <a:xfrm>
-            <a:off x="782697" y="3012253"/>
-            <a:ext cx="1333970" cy="402636"/>
-          </a:xfrm>
-          <a:prstGeom prst="borderCallout2">
-            <a:avLst>
-              <a:gd name="adj1" fmla="val 18750"/>
-              <a:gd name="adj2" fmla="val -8333"/>
-              <a:gd name="adj3" fmla="val 18750"/>
-              <a:gd name="adj4" fmla="val -16667"/>
-              <a:gd name="adj5" fmla="val 171657"/>
-              <a:gd name="adj6" fmla="val -45271"/>
-            </a:avLst>
-          </a:prstGeom>
-        </p:spPr>
-        <p:style>
-          <a:lnRef idx="2">
-            <a:schemeClr val="accent6">
-              <a:shade val="50000"/>
-            </a:schemeClr>
-          </a:lnRef>
-          <a:fillRef idx="1">
-            <a:schemeClr val="accent6"/>
-          </a:fillRef>
-          <a:effectRef idx="0">
-            <a:schemeClr val="accent6"/>
-          </a:effectRef>
-          <a:fontRef idx="minor">
-            <a:schemeClr val="lt1"/>
-          </a:fontRef>
-        </p:style>
-        <p:txBody>
-          <a:bodyPr rtlCol="0" anchor="ctr"/>
-          <a:lstStyle/>
-          <a:p>
-            <a:pPr algn="ctr"/>
-            <a:r>
-              <a:rPr lang="en-US" sz="1200" dirty="0" smtClean="0"/>
-              <a:t>Sensor values &amp; Colors</a:t>
-            </a:r>
-            <a:endParaRPr lang="en-US" sz="1200" dirty="0"/>
-          </a:p>
-        </p:txBody>
-      </p:sp>
     </p:spTree>
     <p:extLst>
       <p:ext uri="{BB962C8B-B14F-4D97-AF65-F5344CB8AC3E}">
-        <p14:creationId xmlns:p14="http://schemas.microsoft.com/office/powerpoint/2010/main" val="1582188903"/>
+        <p14:creationId xmlns:p14="http://schemas.microsoft.com/office/powerpoint/2010/main" val="84800042"/>
       </p:ext>
     </p:extLst>
   </p:cSld>
@@ -5503,183 +5189,351 @@
           <a:chExt cx="0" cy="0"/>
         </a:xfrm>
       </p:grpSpPr>
-      <p:sp>
-        <p:nvSpPr>
-          <p:cNvPr id="4" name="TextBox 3"/>
-          <p:cNvSpPr txBox="1"/>
-          <p:nvPr/>
-        </p:nvSpPr>
-        <p:spPr>
-          <a:xfrm>
-            <a:off x="1651585" y="865481"/>
-            <a:ext cx="184666" cy="369332"/>
-          </a:xfrm>
-          <a:prstGeom prst="rect">
-            <a:avLst/>
-          </a:prstGeom>
-          <a:noFill/>
-        </p:spPr>
-        <p:txBody>
-          <a:bodyPr wrap="none" rtlCol="0">
-            <a:spAutoFit/>
-          </a:bodyPr>
-          <a:lstStyle/>
-          <a:p>
-            <a:endParaRPr lang="en-US" dirty="0"/>
-          </a:p>
-        </p:txBody>
-      </p:sp>
       <p:pic>
         <p:nvPicPr>
-          <p:cNvPr id="5" name="Picture 4" descr="device-2015-10-07-152144.png"/>
+          <p:cNvPr id="15" name="Picture 14"/>
           <p:cNvPicPr>
             <a:picLocks noChangeAspect="1"/>
           </p:cNvPicPr>
           <p:nvPr/>
         </p:nvPicPr>
         <p:blipFill>
-          <a:blip r:embed="rId2" cstate="print">
-            <a:extLst>
-              <a:ext uri="{28A0092B-C50C-407E-A947-70E740481C1C}">
-                <a14:useLocalDpi xmlns:a14="http://schemas.microsoft.com/office/drawing/2010/main" val="0"/>
-              </a:ext>
-            </a:extLst>
-          </a:blip>
+          <a:blip r:embed="rId2"/>
           <a:stretch>
             <a:fillRect/>
           </a:stretch>
         </p:blipFill>
         <p:spPr>
           <a:xfrm>
-            <a:off x="1389118" y="592663"/>
-            <a:ext cx="2042583" cy="3631259"/>
+            <a:off x="0" y="0"/>
+            <a:ext cx="9144000" cy="5143500"/>
           </a:xfrm>
           <a:prstGeom prst="rect">
             <a:avLst/>
           </a:prstGeom>
-          <a:ln>
-            <a:solidFill>
-              <a:schemeClr val="tx1"/>
-            </a:solidFill>
-          </a:ln>
-          <a:effectLst>
-            <a:glow rad="101600">
-              <a:schemeClr val="bg2">
-                <a:lumMod val="20000"/>
-                <a:lumOff val="80000"/>
-                <a:alpha val="75000"/>
-              </a:schemeClr>
-            </a:glow>
-            <a:outerShdw blurRad="50800" dist="38100" dir="2700000" algn="tl" rotWithShape="0">
-              <a:srgbClr val="000000">
-                <a:alpha val="43000"/>
-              </a:srgbClr>
-            </a:outerShdw>
-          </a:effectLst>
         </p:spPr>
       </p:pic>
-      <p:pic>
-        <p:nvPicPr>
-          <p:cNvPr id="6" name="Picture 5" descr="device-2015-10-07-152227.png"/>
-          <p:cNvPicPr>
-            <a:picLocks noChangeAspect="1"/>
-          </p:cNvPicPr>
+      <p:sp>
+        <p:nvSpPr>
+          <p:cNvPr id="10" name="Line Callout 2 9"/>
+          <p:cNvSpPr/>
           <p:nvPr/>
-        </p:nvPicPr>
-        <p:blipFill>
-          <a:blip r:embed="rId3" cstate="print">
-            <a:extLst>
-              <a:ext uri="{28A0092B-C50C-407E-A947-70E740481C1C}">
-                <a14:useLocalDpi xmlns:a14="http://schemas.microsoft.com/office/drawing/2010/main" val="0"/>
-              </a:ext>
-            </a:extLst>
-          </a:blip>
-          <a:stretch>
-            <a:fillRect/>
-          </a:stretch>
-        </p:blipFill>
-        <p:spPr>
-          <a:xfrm>
-            <a:off x="3947945" y="592666"/>
-            <a:ext cx="2042584" cy="3631259"/>
-          </a:xfrm>
-          <a:prstGeom prst="rect">
-            <a:avLst/>
+        </p:nvSpPr>
+        <p:spPr>
+          <a:xfrm>
+            <a:off x="1514593" y="620890"/>
+            <a:ext cx="809037" cy="225778"/>
+          </a:xfrm>
+          <a:prstGeom prst="borderCallout2">
+            <a:avLst>
+              <a:gd name="adj1" fmla="val 18750"/>
+              <a:gd name="adj2" fmla="val -8333"/>
+              <a:gd name="adj3" fmla="val 18750"/>
+              <a:gd name="adj4" fmla="val -16667"/>
+              <a:gd name="adj5" fmla="val 53316"/>
+              <a:gd name="adj6" fmla="val -83402"/>
+            </a:avLst>
           </a:prstGeom>
-          <a:ln>
-            <a:solidFill>
-              <a:schemeClr val="tx1"/>
-            </a:solidFill>
-          </a:ln>
-          <a:effectLst>
-            <a:glow rad="101600">
-              <a:schemeClr val="bg2">
-                <a:lumMod val="20000"/>
-                <a:lumOff val="80000"/>
-                <a:alpha val="75000"/>
-              </a:schemeClr>
-            </a:glow>
-            <a:outerShdw blurRad="50800" dist="38100" dir="2700000" algn="tl" rotWithShape="0">
-              <a:srgbClr val="000000">
-                <a:alpha val="43000"/>
-              </a:srgbClr>
-            </a:outerShdw>
-          </a:effectLst>
-        </p:spPr>
-      </p:pic>
-      <p:pic>
-        <p:nvPicPr>
-          <p:cNvPr id="7" name="Picture 6" descr="device-2015-10-07-152242.png"/>
-          <p:cNvPicPr>
-            <a:picLocks noChangeAspect="1"/>
-          </p:cNvPicPr>
+        </p:spPr>
+        <p:style>
+          <a:lnRef idx="2">
+            <a:schemeClr val="accent6">
+              <a:shade val="50000"/>
+            </a:schemeClr>
+          </a:lnRef>
+          <a:fillRef idx="1">
+            <a:schemeClr val="accent6"/>
+          </a:fillRef>
+          <a:effectRef idx="0">
+            <a:schemeClr val="accent6"/>
+          </a:effectRef>
+          <a:fontRef idx="minor">
+            <a:schemeClr val="lt1"/>
+          </a:fontRef>
+        </p:style>
+        <p:txBody>
+          <a:bodyPr rtlCol="0" anchor="ctr"/>
+          <a:lstStyle/>
+          <a:p>
+            <a:pPr algn="ctr"/>
+            <a:r>
+              <a:rPr lang="en-US" sz="1200" dirty="0" smtClean="0"/>
+              <a:t>Layers</a:t>
+            </a:r>
+            <a:endParaRPr lang="en-US" sz="1200" dirty="0"/>
+          </a:p>
+        </p:txBody>
+      </p:sp>
+      <p:sp>
+        <p:nvSpPr>
+          <p:cNvPr id="11" name="Line Callout 2 10"/>
+          <p:cNvSpPr/>
           <p:nvPr/>
-        </p:nvPicPr>
-        <p:blipFill>
-          <a:blip r:embed="rId4" cstate="print">
-            <a:extLst>
-              <a:ext uri="{28A0092B-C50C-407E-A947-70E740481C1C}">
-                <a14:useLocalDpi xmlns:a14="http://schemas.microsoft.com/office/drawing/2010/main" val="0"/>
-              </a:ext>
-            </a:extLst>
-          </a:blip>
-          <a:stretch>
-            <a:fillRect/>
-          </a:stretch>
-        </p:blipFill>
-        <p:spPr>
-          <a:xfrm>
-            <a:off x="6506763" y="592666"/>
-            <a:ext cx="2042583" cy="3631259"/>
-          </a:xfrm>
-          <a:prstGeom prst="rect">
-            <a:avLst/>
+        </p:nvSpPr>
+        <p:spPr>
+          <a:xfrm>
+            <a:off x="2824104" y="4684419"/>
+            <a:ext cx="4278489" cy="460963"/>
+          </a:xfrm>
+          <a:prstGeom prst="borderCallout2">
+            <a:avLst>
+              <a:gd name="adj1" fmla="val 18750"/>
+              <a:gd name="adj2" fmla="val -8333"/>
+              <a:gd name="adj3" fmla="val 18750"/>
+              <a:gd name="adj4" fmla="val -16667"/>
+              <a:gd name="adj5" fmla="val 36990"/>
+              <a:gd name="adj6" fmla="val -44888"/>
+            </a:avLst>
           </a:prstGeom>
-          <a:ln>
-            <a:solidFill>
-              <a:schemeClr val="tx1"/>
-            </a:solidFill>
-          </a:ln>
-          <a:effectLst>
-            <a:glow rad="101600">
-              <a:schemeClr val="bg2">
-                <a:lumMod val="20000"/>
-                <a:lumOff val="80000"/>
-                <a:alpha val="75000"/>
-              </a:schemeClr>
-            </a:glow>
-            <a:outerShdw blurRad="50800" dist="38100" dir="2700000" algn="tl" rotWithShape="0">
-              <a:srgbClr val="000000">
-                <a:alpha val="43000"/>
-              </a:srgbClr>
-            </a:outerShdw>
-          </a:effectLst>
-        </p:spPr>
-      </p:pic>
+        </p:spPr>
+        <p:style>
+          <a:lnRef idx="2">
+            <a:schemeClr val="accent6">
+              <a:shade val="50000"/>
+            </a:schemeClr>
+          </a:lnRef>
+          <a:fillRef idx="1">
+            <a:schemeClr val="accent6"/>
+          </a:fillRef>
+          <a:effectRef idx="0">
+            <a:schemeClr val="accent6"/>
+          </a:effectRef>
+          <a:fontRef idx="minor">
+            <a:schemeClr val="lt1"/>
+          </a:fontRef>
+        </p:style>
+        <p:txBody>
+          <a:bodyPr rtlCol="0" anchor="ctr"/>
+          <a:lstStyle/>
+          <a:p>
+            <a:pPr algn="ctr"/>
+            <a:r>
+              <a:rPr lang="en-US" sz="1200" dirty="0" smtClean="0"/>
+              <a:t>Time-Machine.</a:t>
+            </a:r>
+          </a:p>
+          <a:p>
+            <a:pPr algn="ctr"/>
+            <a:r>
+              <a:rPr lang="en-US" sz="1200" dirty="0" smtClean="0"/>
+              <a:t>(Select Date &amp; Time to visualize data from the past)</a:t>
+            </a:r>
+            <a:endParaRPr lang="en-US" sz="1200" dirty="0"/>
+          </a:p>
+        </p:txBody>
+      </p:sp>
+      <p:sp>
+        <p:nvSpPr>
+          <p:cNvPr id="12" name="Line Callout 2 11"/>
+          <p:cNvSpPr/>
+          <p:nvPr/>
+        </p:nvSpPr>
+        <p:spPr>
+          <a:xfrm>
+            <a:off x="5597407" y="1403584"/>
+            <a:ext cx="2372549" cy="460963"/>
+          </a:xfrm>
+          <a:prstGeom prst="borderCallout2">
+            <a:avLst>
+              <a:gd name="adj1" fmla="val 33036"/>
+              <a:gd name="adj2" fmla="val 102132"/>
+              <a:gd name="adj3" fmla="val 20791"/>
+              <a:gd name="adj4" fmla="val 129845"/>
+              <a:gd name="adj5" fmla="val -75255"/>
+              <a:gd name="adj6" fmla="val 143692"/>
+            </a:avLst>
+          </a:prstGeom>
+        </p:spPr>
+        <p:style>
+          <a:lnRef idx="2">
+            <a:schemeClr val="accent6">
+              <a:shade val="50000"/>
+            </a:schemeClr>
+          </a:lnRef>
+          <a:fillRef idx="1">
+            <a:schemeClr val="accent6"/>
+          </a:fillRef>
+          <a:effectRef idx="0">
+            <a:schemeClr val="accent6"/>
+          </a:effectRef>
+          <a:fontRef idx="minor">
+            <a:schemeClr val="lt1"/>
+          </a:fontRef>
+        </p:style>
+        <p:txBody>
+          <a:bodyPr rtlCol="0" anchor="ctr"/>
+          <a:lstStyle/>
+          <a:p>
+            <a:pPr algn="ctr"/>
+            <a:r>
+              <a:rPr lang="en-US" sz="1200" dirty="0" smtClean="0"/>
+              <a:t>Real-time or Time-Machine </a:t>
+            </a:r>
+            <a:r>
+              <a:rPr lang="en-US" sz="1200" smtClean="0"/>
+              <a:t>button / indicator</a:t>
+            </a:r>
+            <a:endParaRPr lang="en-US" sz="1200" dirty="0"/>
+          </a:p>
+        </p:txBody>
+      </p:sp>
+      <p:sp>
+        <p:nvSpPr>
+          <p:cNvPr id="13" name="Line Callout 2 12"/>
+          <p:cNvSpPr/>
+          <p:nvPr/>
+        </p:nvSpPr>
+        <p:spPr>
+          <a:xfrm>
+            <a:off x="4018845" y="846668"/>
+            <a:ext cx="2372549" cy="460963"/>
+          </a:xfrm>
+          <a:prstGeom prst="borderCallout2">
+            <a:avLst>
+              <a:gd name="adj1" fmla="val 33036"/>
+              <a:gd name="adj2" fmla="val 102132"/>
+              <a:gd name="adj3" fmla="val 20791"/>
+              <a:gd name="adj4" fmla="val 129845"/>
+              <a:gd name="adj5" fmla="val -24235"/>
+              <a:gd name="adj6" fmla="val 205944"/>
+            </a:avLst>
+          </a:prstGeom>
+        </p:spPr>
+        <p:style>
+          <a:lnRef idx="2">
+            <a:schemeClr val="accent6">
+              <a:shade val="50000"/>
+            </a:schemeClr>
+          </a:lnRef>
+          <a:fillRef idx="1">
+            <a:schemeClr val="accent6"/>
+          </a:fillRef>
+          <a:effectRef idx="0">
+            <a:schemeClr val="accent6"/>
+          </a:effectRef>
+          <a:fontRef idx="minor">
+            <a:schemeClr val="lt1"/>
+          </a:fontRef>
+        </p:style>
+        <p:txBody>
+          <a:bodyPr rtlCol="0" anchor="ctr"/>
+          <a:lstStyle/>
+          <a:p>
+            <a:pPr algn="ctr"/>
+            <a:r>
+              <a:rPr lang="en-US" sz="1200" dirty="0" smtClean="0"/>
+              <a:t>Server Connection Status Indicator</a:t>
+            </a:r>
+            <a:endParaRPr lang="en-US" sz="1200" dirty="0"/>
+          </a:p>
+        </p:txBody>
+      </p:sp>
+      <p:sp>
+        <p:nvSpPr>
+          <p:cNvPr id="14" name="Line Callout 2 13"/>
+          <p:cNvSpPr/>
+          <p:nvPr/>
+        </p:nvSpPr>
+        <p:spPr>
+          <a:xfrm>
+            <a:off x="5276614" y="276576"/>
+            <a:ext cx="2372549" cy="460963"/>
+          </a:xfrm>
+          <a:prstGeom prst="borderCallout2">
+            <a:avLst>
+              <a:gd name="adj1" fmla="val 33036"/>
+              <a:gd name="adj2" fmla="val 102132"/>
+              <a:gd name="adj3" fmla="val 20791"/>
+              <a:gd name="adj4" fmla="val 129845"/>
+              <a:gd name="adj5" fmla="val 49235"/>
+              <a:gd name="adj6" fmla="val 154794"/>
+            </a:avLst>
+          </a:prstGeom>
+        </p:spPr>
+        <p:style>
+          <a:lnRef idx="2">
+            <a:schemeClr val="accent6">
+              <a:shade val="50000"/>
+            </a:schemeClr>
+          </a:lnRef>
+          <a:fillRef idx="1">
+            <a:schemeClr val="accent6"/>
+          </a:fillRef>
+          <a:effectRef idx="0">
+            <a:schemeClr val="accent6"/>
+          </a:effectRef>
+          <a:fontRef idx="minor">
+            <a:schemeClr val="lt1"/>
+          </a:fontRef>
+        </p:style>
+        <p:txBody>
+          <a:bodyPr rtlCol="0" anchor="ctr"/>
+          <a:lstStyle/>
+          <a:p>
+            <a:pPr algn="ctr"/>
+            <a:r>
+              <a:rPr lang="en-US" sz="1200" dirty="0" smtClean="0"/>
+              <a:t>Download Mobile App button</a:t>
+            </a:r>
+            <a:endParaRPr lang="en-US" sz="1200" dirty="0"/>
+          </a:p>
+        </p:txBody>
+      </p:sp>
+      <p:sp>
+        <p:nvSpPr>
+          <p:cNvPr id="8" name="Line Callout 2 7"/>
+          <p:cNvSpPr/>
+          <p:nvPr/>
+        </p:nvSpPr>
+        <p:spPr>
+          <a:xfrm>
+            <a:off x="782697" y="3012253"/>
+            <a:ext cx="1333970" cy="402636"/>
+          </a:xfrm>
+          <a:prstGeom prst="borderCallout2">
+            <a:avLst>
+              <a:gd name="adj1" fmla="val 18750"/>
+              <a:gd name="adj2" fmla="val -8333"/>
+              <a:gd name="adj3" fmla="val 18750"/>
+              <a:gd name="adj4" fmla="val -16667"/>
+              <a:gd name="adj5" fmla="val 171657"/>
+              <a:gd name="adj6" fmla="val -45271"/>
+            </a:avLst>
+          </a:prstGeom>
+        </p:spPr>
+        <p:style>
+          <a:lnRef idx="2">
+            <a:schemeClr val="accent6">
+              <a:shade val="50000"/>
+            </a:schemeClr>
+          </a:lnRef>
+          <a:fillRef idx="1">
+            <a:schemeClr val="accent6"/>
+          </a:fillRef>
+          <a:effectRef idx="0">
+            <a:schemeClr val="accent6"/>
+          </a:effectRef>
+          <a:fontRef idx="minor">
+            <a:schemeClr val="lt1"/>
+          </a:fontRef>
+        </p:style>
+        <p:txBody>
+          <a:bodyPr rtlCol="0" anchor="ctr"/>
+          <a:lstStyle/>
+          <a:p>
+            <a:pPr algn="ctr"/>
+            <a:r>
+              <a:rPr lang="en-US" sz="1200" dirty="0" smtClean="0"/>
+              <a:t>Sensor values &amp; Colors</a:t>
+            </a:r>
+            <a:endParaRPr lang="en-US" sz="1200" dirty="0"/>
+          </a:p>
+        </p:txBody>
+      </p:sp>
     </p:spTree>
     <p:extLst>
       <p:ext uri="{BB962C8B-B14F-4D97-AF65-F5344CB8AC3E}">
-        <p14:creationId xmlns:p14="http://schemas.microsoft.com/office/powerpoint/2010/main" val="3924777379"/>
+        <p14:creationId xmlns:p14="http://schemas.microsoft.com/office/powerpoint/2010/main" val="1582188903"/>
       </p:ext>
     </p:extLst>
   </p:cSld>
@@ -5713,30 +5567,50 @@
           <a:chExt cx="0" cy="0"/>
         </a:xfrm>
       </p:grpSpPr>
+      <p:sp>
+        <p:nvSpPr>
+          <p:cNvPr id="4" name="TextBox 3"/>
+          <p:cNvSpPr txBox="1"/>
+          <p:nvPr/>
+        </p:nvSpPr>
+        <p:spPr>
+          <a:xfrm>
+            <a:off x="1651585" y="865481"/>
+            <a:ext cx="184666" cy="369332"/>
+          </a:xfrm>
+          <a:prstGeom prst="rect">
+            <a:avLst/>
+          </a:prstGeom>
+          <a:noFill/>
+        </p:spPr>
+        <p:txBody>
+          <a:bodyPr wrap="none" rtlCol="0">
+            <a:spAutoFit/>
+          </a:bodyPr>
+          <a:lstStyle/>
+          <a:p>
+            <a:endParaRPr lang="en-US" dirty="0"/>
+          </a:p>
+        </p:txBody>
+      </p:sp>
       <p:pic>
         <p:nvPicPr>
-          <p:cNvPr id="2" name="Picture 1" descr="device-2015-10-07-152330.png"/>
+          <p:cNvPr id="2" name="Picture 1"/>
           <p:cNvPicPr>
             <a:picLocks noChangeAspect="1"/>
           </p:cNvPicPr>
           <p:nvPr/>
         </p:nvPicPr>
         <p:blipFill>
-          <a:blip r:embed="rId2" cstate="print">
-            <a:extLst>
-              <a:ext uri="{28A0092B-C50C-407E-A947-70E740481C1C}">
-                <a14:useLocalDpi xmlns:a14="http://schemas.microsoft.com/office/drawing/2010/main" val="0"/>
-              </a:ext>
-            </a:extLst>
-          </a:blip>
+          <a:blip r:embed="rId2"/>
           <a:stretch>
             <a:fillRect/>
           </a:stretch>
         </p:blipFill>
         <p:spPr>
           <a:xfrm>
-            <a:off x="2061163" y="639702"/>
-            <a:ext cx="2090209" cy="3715926"/>
+            <a:off x="639591" y="517408"/>
+            <a:ext cx="2023988" cy="3600000"/>
           </a:xfrm>
           <a:prstGeom prst="rect">
             <a:avLst/>
@@ -5747,45 +5621,33 @@
             </a:solidFill>
           </a:ln>
           <a:effectLst>
-            <a:glow rad="101600">
-              <a:schemeClr val="bg2">
-                <a:lumMod val="20000"/>
-                <a:lumOff val="80000"/>
-                <a:alpha val="75000"/>
-              </a:schemeClr>
-            </a:glow>
-            <a:outerShdw blurRad="50800" dist="38100" dir="2700000" algn="tl" rotWithShape="0">
+            <a:outerShdw blurRad="50800" dist="38100" dir="2700000" sx="101000" sy="101000" algn="tl" rotWithShape="0">
               <a:srgbClr val="000000">
                 <a:alpha val="43000"/>
               </a:srgbClr>
             </a:outerShdw>
+            <a:softEdge rad="12700"/>
           </a:effectLst>
         </p:spPr>
       </p:pic>
       <p:pic>
         <p:nvPicPr>
-          <p:cNvPr id="3" name="Picture 2" descr="device-2015-10-07-152344.png"/>
+          <p:cNvPr id="3" name="Picture 2"/>
           <p:cNvPicPr>
             <a:picLocks noChangeAspect="1"/>
           </p:cNvPicPr>
           <p:nvPr/>
         </p:nvPicPr>
         <p:blipFill>
-          <a:blip r:embed="rId3" cstate="print">
-            <a:extLst>
-              <a:ext uri="{28A0092B-C50C-407E-A947-70E740481C1C}">
-                <a14:useLocalDpi xmlns:a14="http://schemas.microsoft.com/office/drawing/2010/main" val="0"/>
-              </a:ext>
-            </a:extLst>
-          </a:blip>
+          <a:blip r:embed="rId3"/>
           <a:stretch>
             <a:fillRect/>
           </a:stretch>
         </p:blipFill>
         <p:spPr>
           <a:xfrm>
-            <a:off x="5306718" y="639702"/>
-            <a:ext cx="2090209" cy="3715926"/>
+            <a:off x="3349978" y="517408"/>
+            <a:ext cx="2023988" cy="3600000"/>
           </a:xfrm>
           <a:prstGeom prst="rect">
             <a:avLst/>
@@ -5796,18 +5658,160 @@
             </a:solidFill>
           </a:ln>
           <a:effectLst>
-            <a:glow rad="101600">
-              <a:schemeClr val="bg2">
-                <a:lumMod val="20000"/>
-                <a:lumOff val="80000"/>
-                <a:alpha val="75000"/>
-              </a:schemeClr>
-            </a:glow>
-            <a:outerShdw blurRad="50800" dist="38100" dir="2700000" algn="tl" rotWithShape="0">
+            <a:outerShdw blurRad="50800" dist="38100" dir="2700000" sx="101000" sy="101000" algn="tl" rotWithShape="0">
               <a:srgbClr val="000000">
                 <a:alpha val="43000"/>
               </a:srgbClr>
             </a:outerShdw>
+            <a:softEdge rad="12700"/>
+          </a:effectLst>
+        </p:spPr>
+      </p:pic>
+      <p:pic>
+        <p:nvPicPr>
+          <p:cNvPr id="8" name="Picture 7"/>
+          <p:cNvPicPr>
+            <a:picLocks noChangeAspect="1"/>
+          </p:cNvPicPr>
+          <p:nvPr/>
+        </p:nvPicPr>
+        <p:blipFill>
+          <a:blip r:embed="rId4"/>
+          <a:stretch>
+            <a:fillRect/>
+          </a:stretch>
+        </p:blipFill>
+        <p:spPr>
+          <a:xfrm>
+            <a:off x="6015973" y="517408"/>
+            <a:ext cx="2023988" cy="3600000"/>
+          </a:xfrm>
+          <a:prstGeom prst="rect">
+            <a:avLst/>
+          </a:prstGeom>
+          <a:ln>
+            <a:solidFill>
+              <a:schemeClr val="tx1"/>
+            </a:solidFill>
+          </a:ln>
+          <a:effectLst>
+            <a:outerShdw blurRad="50800" dist="38100" dir="2700000" sx="101000" sy="101000" algn="tl" rotWithShape="0">
+              <a:srgbClr val="000000">
+                <a:alpha val="43000"/>
+              </a:srgbClr>
+            </a:outerShdw>
+            <a:softEdge rad="12700"/>
+          </a:effectLst>
+        </p:spPr>
+      </p:pic>
+    </p:spTree>
+    <p:extLst>
+      <p:ext uri="{BB962C8B-B14F-4D97-AF65-F5344CB8AC3E}">
+        <p14:creationId xmlns:p14="http://schemas.microsoft.com/office/powerpoint/2010/main" val="3924777379"/>
+      </p:ext>
+    </p:extLst>
+  </p:cSld>
+  <p:clrMapOvr>
+    <a:masterClrMapping/>
+  </p:clrMapOvr>
+  <p:timing>
+    <p:tnLst>
+      <p:par>
+        <p:cTn xmlns:p14="http://schemas.microsoft.com/office/powerpoint/2010/main" id="1" dur="indefinite" restart="never" nodeType="tmRoot"/>
+      </p:par>
+    </p:tnLst>
+  </p:timing>
+</p:sld>
+</file>
+
+<file path=ppt/slides/slide13.xml><?xml version="1.0" encoding="utf-8"?>
+<p:sld xmlns:a="http://schemas.openxmlformats.org/drawingml/2006/main" xmlns:r="http://schemas.openxmlformats.org/officeDocument/2006/relationships" xmlns:p="http://schemas.openxmlformats.org/presentationml/2006/main">
+  <p:cSld>
+    <p:spTree>
+      <p:nvGrpSpPr>
+        <p:cNvPr id="1" name=""/>
+        <p:cNvGrpSpPr/>
+        <p:nvPr/>
+      </p:nvGrpSpPr>
+      <p:grpSpPr>
+        <a:xfrm>
+          <a:off x="0" y="0"/>
+          <a:ext cx="0" cy="0"/>
+          <a:chOff x="0" y="0"/>
+          <a:chExt cx="0" cy="0"/>
+        </a:xfrm>
+      </p:grpSpPr>
+      <p:pic>
+        <p:nvPicPr>
+          <p:cNvPr id="4" name="Picture 3"/>
+          <p:cNvPicPr>
+            <a:picLocks noChangeAspect="1"/>
+          </p:cNvPicPr>
+          <p:nvPr/>
+        </p:nvPicPr>
+        <p:blipFill>
+          <a:blip r:embed="rId2"/>
+          <a:stretch>
+            <a:fillRect/>
+          </a:stretch>
+        </p:blipFill>
+        <p:spPr>
+          <a:xfrm>
+            <a:off x="5212644" y="799630"/>
+            <a:ext cx="2023988" cy="3600000"/>
+          </a:xfrm>
+          <a:prstGeom prst="rect">
+            <a:avLst/>
+          </a:prstGeom>
+          <a:ln>
+            <a:solidFill>
+              <a:schemeClr val="tx1"/>
+            </a:solidFill>
+          </a:ln>
+          <a:effectLst>
+            <a:outerShdw blurRad="50800" dist="38100" dir="2700000" sx="101000" sy="101000" algn="tl" rotWithShape="0">
+              <a:srgbClr val="000000">
+                <a:alpha val="43000"/>
+              </a:srgbClr>
+            </a:outerShdw>
+            <a:softEdge rad="12700"/>
+          </a:effectLst>
+        </p:spPr>
+      </p:pic>
+      <p:pic>
+        <p:nvPicPr>
+          <p:cNvPr id="5" name="Picture 4"/>
+          <p:cNvPicPr>
+            <a:picLocks noChangeAspect="1"/>
+          </p:cNvPicPr>
+          <p:nvPr/>
+        </p:nvPicPr>
+        <p:blipFill>
+          <a:blip r:embed="rId3"/>
+          <a:stretch>
+            <a:fillRect/>
+          </a:stretch>
+        </p:blipFill>
+        <p:spPr>
+          <a:xfrm>
+            <a:off x="1026349" y="799630"/>
+            <a:ext cx="2023988" cy="3600000"/>
+          </a:xfrm>
+          <a:prstGeom prst="rect">
+            <a:avLst/>
+          </a:prstGeom>
+          <a:ln>
+            <a:solidFill>
+              <a:schemeClr val="tx1"/>
+            </a:solidFill>
+          </a:ln>
+          <a:effectLst>
+            <a:outerShdw blurRad="50800" dist="38100" dir="2700000" sx="101000" sy="101000" algn="tl" rotWithShape="0">
+              <a:srgbClr val="000000">
+                <a:alpha val="43000"/>
+              </a:srgbClr>
+            </a:outerShdw>
+            <a:softEdge rad="12700"/>
           </a:effectLst>
         </p:spPr>
       </p:pic>
@@ -5831,7 +5835,7 @@
 </p:sld>
 </file>
 
-<file path=ppt/slides/slide13.xml><?xml version="1.0" encoding="utf-8"?>
+<file path=ppt/slides/slide14.xml><?xml version="1.0" encoding="utf-8"?>
 <p:sld xmlns:a="http://schemas.openxmlformats.org/drawingml/2006/main" xmlns:r="http://schemas.openxmlformats.org/officeDocument/2006/relationships" xmlns:p="http://schemas.openxmlformats.org/presentationml/2006/main">
   <p:cSld>
     <p:spTree>
@@ -6347,8 +6351,8 @@
         </p:nvSpPr>
         <p:spPr>
           <a:xfrm>
-            <a:off x="959557" y="1251775"/>
-            <a:ext cx="7518400" cy="3602447"/>
+            <a:off x="959556" y="983087"/>
+            <a:ext cx="7892813" cy="4012246"/>
           </a:xfrm>
           <a:prstGeom prst="rect">
             <a:avLst/>
@@ -6576,15 +6580,7 @@
             <a:pPr lvl="1" algn="just"/>
             <a:r>
               <a:rPr lang="en-US" dirty="0" smtClean="0"/>
-              <a:t>Data is cleared after </a:t>
-            </a:r>
-            <a:r>
-              <a:rPr lang="en-US" dirty="0" smtClean="0"/>
-              <a:t>5 minutes (300 seconds) </a:t>
-            </a:r>
-            <a:r>
-              <a:rPr lang="en-US" dirty="0" smtClean="0"/>
-              <a:t>to avoid the possibility of large amount of data being shown on the map.</a:t>
+              <a:t>Markers are cleared from the map after 5 minutes (300 seconds) to avoid the possibility of large amount of data being shown on the map.</a:t>
             </a:r>
           </a:p>
           <a:p>
@@ -6605,27 +6601,7 @@
             <a:pPr lvl="1" algn="just"/>
             <a:r>
               <a:rPr lang="en-US" dirty="0" smtClean="0"/>
-              <a:t>Again limited to </a:t>
-            </a:r>
-            <a:r>
-              <a:rPr lang="en-US" dirty="0" smtClean="0"/>
-              <a:t>30 minutes </a:t>
-            </a:r>
-            <a:r>
-              <a:rPr lang="en-US" dirty="0" smtClean="0"/>
-              <a:t>window </a:t>
-            </a:r>
-            <a:r>
-              <a:rPr lang="en-US" dirty="0" smtClean="0"/>
-              <a:t>period from </a:t>
-            </a:r>
-            <a:r>
-              <a:rPr lang="en-US" smtClean="0"/>
-              <a:t>the start time </a:t>
-            </a:r>
-            <a:r>
-              <a:rPr lang="en-US" dirty="0" smtClean="0"/>
-              <a:t>chosen by the user.</a:t>
+              <a:t>Time range is limited to 30 minutes window period from the start time chosen by the user.</a:t>
             </a:r>
           </a:p>
           <a:p>
@@ -6661,6 +6637,21 @@
             <a:r>
               <a:rPr lang="en-US" dirty="0" smtClean="0"/>
               <a:t>Text Message and web links.</a:t>
+            </a:r>
+          </a:p>
+          <a:p>
+            <a:pPr lvl="1" algn="just"/>
+            <a:r>
+              <a:rPr lang="en-US" dirty="0" smtClean="0"/>
+              <a:t>Share links, favorites websites directly from external apps and browser on Android and </a:t>
+            </a:r>
+            <a:r>
+              <a:rPr lang="en-US" dirty="0" err="1" smtClean="0"/>
+              <a:t>iOS</a:t>
+            </a:r>
+            <a:r>
+              <a:rPr lang="en-US" dirty="0" smtClean="0"/>
+              <a:t> devices.</a:t>
             </a:r>
           </a:p>
           <a:p>
@@ -6746,7 +6737,9 @@
         </p:nvSpPr>
         <p:spPr/>
         <p:txBody>
-          <a:bodyPr/>
+          <a:bodyPr>
+            <a:normAutofit fontScale="92500" lnSpcReduction="20000"/>
+          </a:bodyPr>
           <a:lstStyle/>
           <a:p>
             <a:r>
@@ -6764,6 +6757,18 @@
             <a:r>
               <a:rPr lang="en-US" dirty="0" smtClean="0"/>
               <a:t>Report inappropriate content.</a:t>
+            </a:r>
+          </a:p>
+          <a:p>
+            <a:r>
+              <a:rPr lang="en-US" dirty="0" smtClean="0"/>
+              <a:t>Data Volatility – Allow for users to choose how long their data remains on the server.</a:t>
+            </a:r>
+          </a:p>
+          <a:p>
+            <a:r>
+              <a:rPr lang="en-US" dirty="0" smtClean="0"/>
+              <a:t>Auto Upload of Sensor data at specific time intervals.</a:t>
             </a:r>
           </a:p>
           <a:p>
@@ -6935,15 +6940,18 @@
             </a:r>
             <a:r>
               <a:rPr lang="en-US" dirty="0" smtClean="0"/>
-              <a:t>se the download mobile app button in the right corner at </a:t>
-            </a:r>
-            <a:r>
-              <a:rPr lang="en-US" i="1" dirty="0" smtClean="0">
+              <a:t>se the download mobile app button in the right corner on the website at </a:t>
+            </a:r>
+            <a:r>
+              <a:rPr lang="en-US" dirty="0" smtClean="0">
                 <a:hlinkClick r:id="rId2"/>
               </a:rPr>
-              <a:t>http://pulse.inn.ac</a:t>
-            </a:r>
-            <a:endParaRPr lang="en-US" i="1" dirty="0" smtClean="0"/>
+              <a:t>www.swarmpulse.net</a:t>
+            </a:r>
+            <a:r>
+              <a:rPr lang="en-US" dirty="0" smtClean="0"/>
+              <a:t>.</a:t>
+            </a:r>
           </a:p>
           <a:p>
             <a:pPr lvl="1"/>
@@ -6992,12 +7000,12 @@
               <a:t>	View website at: </a:t>
             </a:r>
             <a:r>
-              <a:rPr lang="en-US" i="1" dirty="0">
+              <a:rPr lang="en-US" dirty="0" smtClean="0">
                 <a:hlinkClick r:id="rId2"/>
               </a:rPr>
-              <a:t>http://pulse.inn.ac</a:t>
-            </a:r>
-            <a:endParaRPr lang="en-US" i="1" dirty="0"/>
+              <a:t>www.swarmpulse.net</a:t>
+            </a:r>
+            <a:endParaRPr lang="en-US" dirty="0" smtClean="0"/>
           </a:p>
           <a:p>
             <a:pPr marL="349250" lvl="1" indent="0">
@@ -7474,7 +7482,7 @@
       </p:grpSpPr>
       <p:pic>
         <p:nvPicPr>
-          <p:cNvPr id="7" name="Picture 6"/>
+          <p:cNvPr id="4" name="Picture 3"/>
           <p:cNvPicPr>
             <a:picLocks noChangeAspect="1"/>
           </p:cNvPicPr>
@@ -7488,8 +7496,8 @@
         </p:blipFill>
         <p:spPr>
           <a:xfrm>
-            <a:off x="0" y="0"/>
-            <a:ext cx="9144000" cy="5143500"/>
+            <a:off x="12700" y="0"/>
+            <a:ext cx="9118023" cy="5143500"/>
           </a:xfrm>
           <a:prstGeom prst="rect">
             <a:avLst/>
@@ -7499,20 +7507,13 @@
     </p:spTree>
     <p:extLst>
       <p:ext uri="{BB962C8B-B14F-4D97-AF65-F5344CB8AC3E}">
-        <p14:creationId xmlns:p14="http://schemas.microsoft.com/office/powerpoint/2010/main" val="84800042"/>
+        <p14:creationId xmlns:p14="http://schemas.microsoft.com/office/powerpoint/2010/main" val="2399634391"/>
       </p:ext>
     </p:extLst>
   </p:cSld>
   <p:clrMapOvr>
     <a:masterClrMapping/>
   </p:clrMapOvr>
-  <p:timing>
-    <p:tnLst>
-      <p:par>
-        <p:cTn xmlns:p14="http://schemas.microsoft.com/office/powerpoint/2010/main" id="1" dur="indefinite" restart="never" nodeType="tmRoot"/>
-      </p:par>
-    </p:tnLst>
-  </p:timing>
 </p:sld>
 </file>
 

</xml_diff>

<commit_message>
Minor changes to documents
</commit_message>
<xml_diff>
--- a/Documents/presentation.pptx
+++ b/Documents/presentation.pptx
@@ -208,7 +208,7 @@
           <a:p>
             <a:fld id="{2D28A4D0-5E33-EA41-BC3E-717E2CF0BFD0}" type="datetime1">
               <a:rPr lang="en-US" smtClean="0"/>
-              <a:t>16/11/15</a:t>
+              <a:t>24/11/15</a:t>
             </a:fld>
             <a:endParaRPr lang="en-US"/>
           </a:p>
@@ -378,7 +378,7 @@
           <a:p>
             <a:fld id="{BD3A36AC-0A70-E14A-AD22-51FAB6B9D711}" type="datetime1">
               <a:rPr lang="en-US" smtClean="0"/>
-              <a:t>16/11/15</a:t>
+              <a:t>24/11/15</a:t>
             </a:fld>
             <a:endParaRPr lang="en-US"/>
           </a:p>
@@ -1084,7 +1084,7 @@
           <a:p>
             <a:fld id="{4CCE7824-2366-B646-9D82-1AA12C26FB92}" type="datetime1">
               <a:rPr lang="en-US" smtClean="0"/>
-              <a:t>16/11/15</a:t>
+              <a:t>24/11/15</a:t>
             </a:fld>
             <a:endParaRPr lang="en-US"/>
           </a:p>
@@ -1409,7 +1409,7 @@
           <a:p>
             <a:fld id="{98971330-2ADC-3547-A350-17C412707A10}" type="datetime1">
               <a:rPr lang="en-US" smtClean="0"/>
-              <a:t>16/11/15</a:t>
+              <a:t>24/11/15</a:t>
             </a:fld>
             <a:endParaRPr lang="en-US"/>
           </a:p>
@@ -1690,7 +1690,7 @@
           <a:p>
             <a:fld id="{C420034A-2917-CE47-AE7B-9E328E859982}" type="datetime1">
               <a:rPr lang="en-US" smtClean="0"/>
-              <a:t>16/11/15</a:t>
+              <a:t>24/11/15</a:t>
             </a:fld>
             <a:endParaRPr lang="en-US"/>
           </a:p>
@@ -1988,7 +1988,7 @@
           <a:p>
             <a:fld id="{2217A1B5-83C0-854A-917D-54D7B0AC02FA}" type="datetime1">
               <a:rPr lang="en-US" smtClean="0"/>
-              <a:t>16/11/15</a:t>
+              <a:t>24/11/15</a:t>
             </a:fld>
             <a:endParaRPr lang="en-US"/>
           </a:p>
@@ -2321,7 +2321,7 @@
           <a:p>
             <a:fld id="{47764A90-A220-E946-A659-2DE45E4F75DD}" type="datetime1">
               <a:rPr lang="en-US" smtClean="0"/>
-              <a:t>16/11/15</a:t>
+              <a:t>24/11/15</a:t>
             </a:fld>
             <a:endParaRPr lang="en-US"/>
           </a:p>
@@ -2576,7 +2576,7 @@
           <a:p>
             <a:fld id="{C763F39E-8C81-094B-81E7-AD1A376894E9}" type="datetime1">
               <a:rPr lang="en-US" smtClean="0"/>
-              <a:t>16/11/15</a:t>
+              <a:t>24/11/15</a:t>
             </a:fld>
             <a:endParaRPr lang="en-US"/>
           </a:p>
@@ -2759,7 +2759,7 @@
           <a:p>
             <a:fld id="{00D0E65B-C714-714F-90B3-16C6ACA5029D}" type="datetime1">
               <a:rPr lang="en-US" smtClean="0"/>
-              <a:t>16/11/15</a:t>
+              <a:t>24/11/15</a:t>
             </a:fld>
             <a:endParaRPr lang="en-US"/>
           </a:p>
@@ -2932,7 +2932,7 @@
           <a:p>
             <a:fld id="{061F6D89-5AAD-B144-8A94-2AA145B5D59B}" type="datetime1">
               <a:rPr lang="en-US" smtClean="0"/>
-              <a:t>16/11/15</a:t>
+              <a:t>24/11/15</a:t>
             </a:fld>
             <a:endParaRPr lang="en-US"/>
           </a:p>
@@ -3205,7 +3205,7 @@
           <a:p>
             <a:fld id="{53033B26-BDC2-194F-8CE1-A069C9157E8E}" type="datetime1">
               <a:rPr lang="en-US" smtClean="0"/>
-              <a:t>16/11/15</a:t>
+              <a:t>24/11/15</a:t>
             </a:fld>
             <a:endParaRPr lang="en-US"/>
           </a:p>
@@ -3516,7 +3516,7 @@
           <a:p>
             <a:fld id="{94CA5907-79B4-DC4E-BA77-045C7D986ED0}" type="datetime1">
               <a:rPr lang="en-US" smtClean="0"/>
-              <a:t>16/11/15</a:t>
+              <a:t>24/11/15</a:t>
             </a:fld>
             <a:endParaRPr lang="en-US"/>
           </a:p>
@@ -3812,7 +3812,7 @@
           <a:p>
             <a:fld id="{84AE61B6-17FC-1244-B3AB-B0423AE67495}" type="datetime1">
               <a:rPr lang="en-US" smtClean="0"/>
-              <a:t>16/11/15</a:t>
+              <a:t>24/11/15</a:t>
             </a:fld>
             <a:endParaRPr lang="en-US"/>
           </a:p>
@@ -4246,7 +4246,7 @@
           <a:p>
             <a:fld id="{4C0376A7-0BAB-3C47-9885-08AB38229D50}" type="datetime1">
               <a:rPr lang="en-US" smtClean="0"/>
-              <a:t>16/11/15</a:t>
+              <a:t>24/11/15</a:t>
             </a:fld>
             <a:endParaRPr lang="en-US"/>
           </a:p>
@@ -4596,7 +4596,7 @@
           <a:p>
             <a:fld id="{DE14FCD7-872E-8244-94A3-9104B98E2640}" type="datetime1">
               <a:rPr lang="en-US" smtClean="0"/>
-              <a:t>16/11/15</a:t>
+              <a:t>24/11/15</a:t>
             </a:fld>
             <a:endParaRPr lang="en-US"/>
           </a:p>
@@ -4690,7 +4690,7 @@
           <a:p>
             <a:fld id="{1FA3EA18-01E7-F848-84C8-4A533ECC7296}" type="datetime1">
               <a:rPr lang="en-US" smtClean="0"/>
-              <a:t>16/11/15</a:t>
+              <a:t>24/11/15</a:t>
             </a:fld>
             <a:endParaRPr lang="en-US"/>
           </a:p>
@@ -5031,7 +5031,7 @@
           <a:p>
             <a:fld id="{BC8152E3-D5B7-504A-8A58-C3AB0A2AD7E6}" type="datetime1">
               <a:rPr lang="en-US" smtClean="0"/>
-              <a:t>16/11/15</a:t>
+              <a:t>24/11/15</a:t>
             </a:fld>
             <a:endParaRPr lang="en-US"/>
           </a:p>
@@ -5247,7 +5247,7 @@
           <a:p>
             <a:fld id="{2BD8A107-4E80-D141-8EDD-E63D35C7DA5F}" type="datetime1">
               <a:rPr lang="en-US" smtClean="0"/>
-              <a:t>16/11/15</a:t>
+              <a:t>24/11/15</a:t>
             </a:fld>
             <a:endParaRPr lang="en-US"/>
           </a:p>
@@ -5885,7 +5885,7 @@
         </p:nvSpPr>
         <p:spPr>
           <a:xfrm>
-            <a:off x="6429689" y="4931813"/>
+            <a:off x="6429689" y="4788929"/>
             <a:ext cx="2531476" cy="261610"/>
           </a:xfrm>
           <a:prstGeom prst="rect">
@@ -5902,8 +5902,9 @@
             <a:r>
               <a:rPr lang="en-US" sz="1100" dirty="0">
                 <a:solidFill>
-                  <a:schemeClr val="bg1">
-                    <a:lumMod val="85000"/>
+                  <a:schemeClr val="tx1">
+                    <a:lumMod val="50000"/>
+                    <a:lumOff val="50000"/>
                   </a:schemeClr>
                 </a:solidFill>
                 <a:latin typeface="Nunito-Regular"/>
@@ -5914,8 +5915,9 @@
             <a:r>
               <a:rPr lang="en-US" sz="1100" dirty="0" smtClean="0">
                 <a:solidFill>
-                  <a:schemeClr val="bg1">
-                    <a:lumMod val="85000"/>
+                  <a:schemeClr val="tx1">
+                    <a:lumMod val="50000"/>
+                    <a:lumOff val="50000"/>
                   </a:schemeClr>
                 </a:solidFill>
                 <a:latin typeface="Nunito-Regular"/>
@@ -5925,8 +5927,9 @@
             </a:r>
             <a:endParaRPr lang="en-US" sz="1100" dirty="0">
               <a:solidFill>
-                <a:schemeClr val="bg1">
-                  <a:lumMod val="85000"/>
+                <a:schemeClr val="tx1">
+                  <a:lumMod val="50000"/>
+                  <a:lumOff val="50000"/>
                 </a:schemeClr>
               </a:solidFill>
               <a:latin typeface="Nunito-Regular"/>
@@ -6885,7 +6888,7 @@
         <p:spPr>
           <a:xfrm>
             <a:off x="1505186" y="3461926"/>
-            <a:ext cx="5856065" cy="369332"/>
+            <a:ext cx="3549883" cy="369332"/>
           </a:xfrm>
           <a:prstGeom prst="rect">
             <a:avLst/>
@@ -6899,36 +6902,17 @@
           <a:lstStyle/>
           <a:p>
             <a:r>
-              <a:rPr lang="en-US" dirty="0">
-                <a:hlinkClick r:id="rId2"/>
-              </a:rPr>
+              <a:rPr lang="en-US" dirty="0"/>
               <a:t>https://</a:t>
             </a:r>
             <a:r>
-              <a:rPr lang="en-US" dirty="0" err="1">
-                <a:hlinkClick r:id="rId2"/>
-              </a:rPr>
-              <a:t>www.youtube.com</a:t>
-            </a:r>
-            <a:r>
-              <a:rPr lang="en-US" dirty="0">
-                <a:hlinkClick r:id="rId2"/>
-              </a:rPr>
-              <a:t>/</a:t>
-            </a:r>
-            <a:r>
-              <a:rPr lang="en-US" dirty="0" err="1">
-                <a:hlinkClick r:id="rId2"/>
-              </a:rPr>
-              <a:t>watch?v</a:t>
-            </a:r>
-            <a:r>
-              <a:rPr lang="en-US" dirty="0">
-                <a:hlinkClick r:id="rId2"/>
-              </a:rPr>
-              <a:t>=i7NHOCpvFIY</a:t>
-            </a:r>
-            <a:endParaRPr lang="en-US" dirty="0"/>
+              <a:rPr lang="en-US" dirty="0" err="1"/>
+              <a:t>youtu.be</a:t>
+            </a:r>
+            <a:r>
+              <a:rPr lang="en-US" dirty="0"/>
+              <a:t>/lU_3XKqWesE</a:t>
+            </a:r>
           </a:p>
         </p:txBody>
       </p:sp>

</xml_diff>